<commit_message>
New Standards - Horseshoe Bay
</commit_message>
<xml_diff>
--- a/DUCT_LAYOUT/HEXATRONIC_QGIS_INITIAL_STEPS.pptx
+++ b/DUCT_LAYOUT/HEXATRONIC_QGIS_INITIAL_STEPS.pptx
@@ -159,6 +159,35 @@
 </p:presentation>
 </file>
 
+<file path=ppt/changesInfos/changesInfo1.xml><?xml version="1.0" encoding="utf-8"?>
+<pc:chgInfo xmlns:a="http://schemas.openxmlformats.org/drawingml/2006/main" xmlns:r="http://schemas.openxmlformats.org/officeDocument/2006/relationships" xmlns:ac="http://schemas.microsoft.com/office/drawing/2013/main/command" xmlns:pc="http://schemas.microsoft.com/office/powerpoint/2013/main/command">
+  <pc:docChgLst>
+    <pc:chgData name="Mikko Caguiat" userId="9221ca2b-9a97-4010-80df-3d51c96a761f" providerId="ADAL" clId="{52B94A07-6EBC-4308-A3ED-48EA29623F15}"/>
+    <pc:docChg chg="modSld">
+      <pc:chgData name="Mikko Caguiat" userId="9221ca2b-9a97-4010-80df-3d51c96a761f" providerId="ADAL" clId="{52B94A07-6EBC-4308-A3ED-48EA29623F15}" dt="2023-07-16T07:28:46.691" v="23" actId="20577"/>
+      <pc:docMkLst>
+        <pc:docMk/>
+      </pc:docMkLst>
+      <pc:sldChg chg="modSp mod">
+        <pc:chgData name="Mikko Caguiat" userId="9221ca2b-9a97-4010-80df-3d51c96a761f" providerId="ADAL" clId="{52B94A07-6EBC-4308-A3ED-48EA29623F15}" dt="2023-07-16T07:28:46.691" v="23" actId="20577"/>
+        <pc:sldMkLst>
+          <pc:docMk/>
+          <pc:sldMk cId="4262505200" sldId="287"/>
+        </pc:sldMkLst>
+        <pc:spChg chg="mod">
+          <ac:chgData name="Mikko Caguiat" userId="9221ca2b-9a97-4010-80df-3d51c96a761f" providerId="ADAL" clId="{52B94A07-6EBC-4308-A3ED-48EA29623F15}" dt="2023-07-16T07:28:46.691" v="23" actId="20577"/>
+          <ac:spMkLst>
+            <pc:docMk/>
+            <pc:sldMk cId="4262505200" sldId="287"/>
+            <ac:spMk id="5" creationId="{ABF66CC1-4F46-DF91-6DB1-4C571CD0E85E}"/>
+          </ac:spMkLst>
+        </pc:spChg>
+      </pc:sldChg>
+    </pc:docChg>
+  </pc:docChgLst>
+</pc:chgInfo>
+</file>
+
 <file path=ppt/handoutMasters/handoutMaster1.xml><?xml version="1.0" encoding="utf-8"?>
 <p:handoutMaster xmlns:a="http://schemas.openxmlformats.org/drawingml/2006/main" xmlns:r="http://schemas.openxmlformats.org/officeDocument/2006/relationships" xmlns:p="http://schemas.openxmlformats.org/presentationml/2006/main">
   <p:cSld>
@@ -253,7 +282,7 @@
           <a:p>
             <a:fld id="{6E5C0719-993D-42E1-80ED-8F01056F36C2}" type="datetimeFigureOut">
               <a:rPr lang="en-US" smtClean="0"/>
-              <a:t>7/14/2023</a:t>
+              <a:t>7/16/2023</a:t>
             </a:fld>
             <a:endParaRPr lang="en-US" dirty="0"/>
           </a:p>
@@ -430,7 +459,7 @@
           <a:p>
             <a:fld id="{21D3BC9C-6C58-464F-B94E-FD73C5FB016E}" type="datetimeFigureOut">
               <a:rPr lang="en-US" smtClean="0"/>
-              <a:t>7/14/2023</a:t>
+              <a:t>7/16/2023</a:t>
             </a:fld>
             <a:endParaRPr lang="en-US" dirty="0"/>
           </a:p>
@@ -1516,7 +1545,7 @@
           <a:p>
             <a:fld id="{40DA1498-92C7-4E4B-8045-C9195F453964}" type="datetimeFigureOut">
               <a:rPr lang="en-US" smtClean="0"/>
-              <a:t>7/14/2023</a:t>
+              <a:t>7/16/2023</a:t>
             </a:fld>
             <a:endParaRPr lang="en-US" dirty="0"/>
           </a:p>
@@ -1714,7 +1743,7 @@
           <a:p>
             <a:fld id="{40DA1498-92C7-4E4B-8045-C9195F453964}" type="datetimeFigureOut">
               <a:rPr lang="en-US" smtClean="0"/>
-              <a:t>7/14/2023</a:t>
+              <a:t>7/16/2023</a:t>
             </a:fld>
             <a:endParaRPr lang="en-US" dirty="0"/>
           </a:p>
@@ -1922,7 +1951,7 @@
           <a:p>
             <a:fld id="{40DA1498-92C7-4E4B-8045-C9195F453964}" type="datetimeFigureOut">
               <a:rPr lang="en-US" smtClean="0"/>
-              <a:t>7/14/2023</a:t>
+              <a:t>7/16/2023</a:t>
             </a:fld>
             <a:endParaRPr lang="en-US" dirty="0"/>
           </a:p>
@@ -2120,7 +2149,7 @@
           <a:p>
             <a:fld id="{40DA1498-92C7-4E4B-8045-C9195F453964}" type="datetimeFigureOut">
               <a:rPr lang="en-US" smtClean="0"/>
-              <a:t>7/14/2023</a:t>
+              <a:t>7/16/2023</a:t>
             </a:fld>
             <a:endParaRPr lang="en-US" dirty="0"/>
           </a:p>
@@ -2395,7 +2424,7 @@
           <a:p>
             <a:fld id="{40DA1498-92C7-4E4B-8045-C9195F453964}" type="datetimeFigureOut">
               <a:rPr lang="en-US" smtClean="0"/>
-              <a:t>7/14/2023</a:t>
+              <a:t>7/16/2023</a:t>
             </a:fld>
             <a:endParaRPr lang="en-US" dirty="0"/>
           </a:p>
@@ -2660,7 +2689,7 @@
           <a:p>
             <a:fld id="{40DA1498-92C7-4E4B-8045-C9195F453964}" type="datetimeFigureOut">
               <a:rPr lang="en-US" smtClean="0"/>
-              <a:t>7/14/2023</a:t>
+              <a:t>7/16/2023</a:t>
             </a:fld>
             <a:endParaRPr lang="en-US" dirty="0"/>
           </a:p>
@@ -3072,7 +3101,7 @@
           <a:p>
             <a:fld id="{40DA1498-92C7-4E4B-8045-C9195F453964}" type="datetimeFigureOut">
               <a:rPr lang="en-US" smtClean="0"/>
-              <a:t>7/14/2023</a:t>
+              <a:t>7/16/2023</a:t>
             </a:fld>
             <a:endParaRPr lang="en-US" dirty="0"/>
           </a:p>
@@ -3213,7 +3242,7 @@
           <a:p>
             <a:fld id="{40DA1498-92C7-4E4B-8045-C9195F453964}" type="datetimeFigureOut">
               <a:rPr lang="en-US" smtClean="0"/>
-              <a:t>7/14/2023</a:t>
+              <a:t>7/16/2023</a:t>
             </a:fld>
             <a:endParaRPr lang="en-US" dirty="0"/>
           </a:p>
@@ -3326,7 +3355,7 @@
           <a:p>
             <a:fld id="{40DA1498-92C7-4E4B-8045-C9195F453964}" type="datetimeFigureOut">
               <a:rPr lang="en-US" smtClean="0"/>
-              <a:t>7/14/2023</a:t>
+              <a:t>7/16/2023</a:t>
             </a:fld>
             <a:endParaRPr lang="en-US" dirty="0"/>
           </a:p>
@@ -3637,7 +3666,7 @@
           <a:p>
             <a:fld id="{40DA1498-92C7-4E4B-8045-C9195F453964}" type="datetimeFigureOut">
               <a:rPr lang="en-US" smtClean="0"/>
-              <a:t>7/14/2023</a:t>
+              <a:t>7/16/2023</a:t>
             </a:fld>
             <a:endParaRPr lang="en-US" dirty="0"/>
           </a:p>
@@ -3929,7 +3958,7 @@
           <a:p>
             <a:fld id="{40DA1498-92C7-4E4B-8045-C9195F453964}" type="datetimeFigureOut">
               <a:rPr lang="en-US" smtClean="0"/>
-              <a:t>7/14/2023</a:t>
+              <a:t>7/16/2023</a:t>
             </a:fld>
             <a:endParaRPr lang="en-US" dirty="0"/>
           </a:p>
@@ -4170,7 +4199,7 @@
           <a:p>
             <a:fld id="{40DA1498-92C7-4E4B-8045-C9195F453964}" type="datetimeFigureOut">
               <a:rPr lang="en-US" smtClean="0"/>
-              <a:t>7/14/2023</a:t>
+              <a:t>7/16/2023</a:t>
             </a:fld>
             <a:endParaRPr lang="en-US" dirty="0"/>
           </a:p>
@@ -7765,6 +7794,14 @@
             <a:r>
               <a:rPr lang="en-US" dirty="0" err="1"/>
               <a:t>Hexatronic.gpkg</a:t>
+            </a:r>
+            <a:r>
+              <a:rPr lang="en-US" dirty="0"/>
+              <a:t>(</a:t>
+            </a:r>
+            <a:r>
+              <a:rPr lang="en-US"/>
+              <a:t>or Traditional)</a:t>
             </a:r>
             <a:endParaRPr lang="en-US" dirty="0"/>
           </a:p>
@@ -11033,6 +11070,23 @@
 </file>
 
 <file path=customXml/item1.xml><?xml version="1.0" encoding="utf-8"?>
+<?mso-contentType ?>
+<FormTemplates xmlns="http://schemas.microsoft.com/sharepoint/v3/contenttype/forms">
+  <Display>DocumentLibraryForm</Display>
+  <Edit>DocumentLibraryForm</Edit>
+  <New>DocumentLibraryForm</New>
+</FormTemplates>
+</file>
+
+<file path=customXml/item2.xml><?xml version="1.0" encoding="utf-8"?>
+<p:properties xmlns:p="http://schemas.microsoft.com/office/2006/metadata/properties" xmlns:xsi="http://www.w3.org/2001/XMLSchema-instance" xmlns:pc="http://schemas.microsoft.com/office/infopath/2007/PartnerControls">
+  <documentManagement>
+    <MediaServiceKeyPoints xmlns="71af3243-3dd4-4a8d-8c0d-dd76da1f02a5" xsi:nil="true"/>
+  </documentManagement>
+</p:properties>
+</file>
+
+<file path=customXml/item3.xml><?xml version="1.0" encoding="utf-8"?>
 <ct:contentTypeSchema xmlns:ct="http://schemas.microsoft.com/office/2006/metadata/contentType" xmlns:ma="http://schemas.microsoft.com/office/2006/metadata/properties/metaAttributes" ct:_="" ma:_="" ma:contentTypeName="Document" ma:contentTypeID="0x01010079F111ED35F8CC479449609E8A0923A6" ma:contentTypeVersion="11" ma:contentTypeDescription="Create a new document." ma:contentTypeScope="" ma:versionID="9677210f24a1be23c92c90fd886aa0aa">
   <xsd:schema xmlns:xsd="http://www.w3.org/2001/XMLSchema" xmlns:xs="http://www.w3.org/2001/XMLSchema" xmlns:p="http://schemas.microsoft.com/office/2006/metadata/properties" xmlns:ns2="71af3243-3dd4-4a8d-8c0d-dd76da1f02a5" xmlns:ns3="16c05727-aa75-4e4a-9b5f-8a80a1165891" targetNamespace="http://schemas.microsoft.com/office/2006/metadata/properties" ma:root="true" ma:fieldsID="60e05723c5c1908df1a1a4ebf11d344e" ns2:_="" ns3:_="">
     <xsd:import namespace="71af3243-3dd4-4a8d-8c0d-dd76da1f02a5"/>
@@ -11243,24 +11297,25 @@
 </ct:contentTypeSchema>
 </file>
 
-<file path=customXml/item2.xml><?xml version="1.0" encoding="utf-8"?>
-<p:properties xmlns:p="http://schemas.microsoft.com/office/2006/metadata/properties" xmlns:xsi="http://www.w3.org/2001/XMLSchema-instance" xmlns:pc="http://schemas.microsoft.com/office/infopath/2007/PartnerControls">
-  <documentManagement>
-    <MediaServiceKeyPoints xmlns="71af3243-3dd4-4a8d-8c0d-dd76da1f02a5" xsi:nil="true"/>
-  </documentManagement>
-</p:properties>
+<file path=customXml/itemProps1.xml><?xml version="1.0" encoding="utf-8"?>
+<ds:datastoreItem xmlns:ds="http://schemas.openxmlformats.org/officeDocument/2006/customXml" ds:itemID="{2FD05317-60D6-4B3A-8545-888496D1A8EC}">
+  <ds:schemaRefs>
+    <ds:schemaRef ds:uri="http://schemas.microsoft.com/sharepoint/v3/contenttype/forms"/>
+  </ds:schemaRefs>
+</ds:datastoreItem>
 </file>
 
-<file path=customXml/item3.xml><?xml version="1.0" encoding="utf-8"?>
-<?mso-contentType ?>
-<FormTemplates xmlns="http://schemas.microsoft.com/sharepoint/v3/contenttype/forms">
-  <Display>DocumentLibraryForm</Display>
-  <Edit>DocumentLibraryForm</Edit>
-  <New>DocumentLibraryForm</New>
-</FormTemplates>
+<file path=customXml/itemProps2.xml><?xml version="1.0" encoding="utf-8"?>
+<ds:datastoreItem xmlns:ds="http://schemas.openxmlformats.org/officeDocument/2006/customXml" ds:itemID="{EF609EDA-869E-4BE5-AE5D-B898C584B6FF}">
+  <ds:schemaRefs>
+    <ds:schemaRef ds:uri="http://schemas.microsoft.com/office/2006/metadata/properties"/>
+    <ds:schemaRef ds:uri="http://schemas.microsoft.com/office/infopath/2007/PartnerControls"/>
+    <ds:schemaRef ds:uri="71af3243-3dd4-4a8d-8c0d-dd76da1f02a5"/>
+  </ds:schemaRefs>
+</ds:datastoreItem>
 </file>
 
-<file path=customXml/itemProps1.xml><?xml version="1.0" encoding="utf-8"?>
+<file path=customXml/itemProps3.xml><?xml version="1.0" encoding="utf-8"?>
 <ds:datastoreItem xmlns:ds="http://schemas.openxmlformats.org/officeDocument/2006/customXml" ds:itemID="{61A00BBF-EEBB-4E18-B8CB-F926EAAC48F7}">
   <ds:schemaRefs>
     <ds:schemaRef ds:uri="http://schemas.microsoft.com/office/2006/metadata/contentType"/>
@@ -11277,22 +11332,4 @@
     <ds:schemaRef ds:uri="http://schemas.microsoft.com/internal/obd"/>
   </ds:schemaRefs>
 </ds:datastoreItem>
-</file>
-
-<file path=customXml/itemProps2.xml><?xml version="1.0" encoding="utf-8"?>
-<ds:datastoreItem xmlns:ds="http://schemas.openxmlformats.org/officeDocument/2006/customXml" ds:itemID="{EF609EDA-869E-4BE5-AE5D-B898C584B6FF}">
-  <ds:schemaRefs>
-    <ds:schemaRef ds:uri="http://schemas.microsoft.com/office/2006/metadata/properties"/>
-    <ds:schemaRef ds:uri="http://schemas.microsoft.com/office/infopath/2007/PartnerControls"/>
-    <ds:schemaRef ds:uri="71af3243-3dd4-4a8d-8c0d-dd76da1f02a5"/>
-  </ds:schemaRefs>
-</ds:datastoreItem>
-</file>
-
-<file path=customXml/itemProps3.xml><?xml version="1.0" encoding="utf-8"?>
-<ds:datastoreItem xmlns:ds="http://schemas.openxmlformats.org/officeDocument/2006/customXml" ds:itemID="{2FD05317-60D6-4B3A-8545-888496D1A8EC}">
-  <ds:schemaRefs>
-    <ds:schemaRef ds:uri="http://schemas.microsoft.com/sharepoint/v3/contenttype/forms"/>
-  </ds:schemaRefs>
-</ds:datastoreItem>
 </file>
</xml_diff>